<commit_message>
Update: bending after phase corrector - 2nd order terms
</commit_message>
<xml_diff>
--- a/LCLS/Meeting_08-11-2021_2nd_order_phase_plate.pptx
+++ b/LCLS/Meeting_08-11-2021_2nd_order_phase_plate.pptx
@@ -140,6 +140,9 @@
         </p14:section>
       </p14:sectionLst>
     </p:ext>
+    <p:ext uri="{EFAFB233-063F-42B5-8137-9DF3F51BA10A}">
+      <p15:sldGuideLst xmlns:p15="http://schemas.microsoft.com/office/powerpoint/2012/main"/>
+    </p:ext>
   </p:extLst>
 </p:presentation>
 </file>
@@ -303,7 +306,7 @@
           <a:p>
             <a:fld id="{6991779C-02C2-4FFC-86FD-D4C9633BD2DE}" type="datetimeFigureOut">
               <a:rPr lang="en-US" smtClean="0"/>
-              <a:t>8/10/2021</a:t>
+              <a:t>8/12/2021</a:t>
             </a:fld>
             <a:endParaRPr lang="en-US"/>
           </a:p>
@@ -501,7 +504,7 @@
           <a:p>
             <a:fld id="{6991779C-02C2-4FFC-86FD-D4C9633BD2DE}" type="datetimeFigureOut">
               <a:rPr lang="en-US" smtClean="0"/>
-              <a:t>8/10/2021</a:t>
+              <a:t>8/12/2021</a:t>
             </a:fld>
             <a:endParaRPr lang="en-US"/>
           </a:p>
@@ -709,7 +712,7 @@
           <a:p>
             <a:fld id="{6991779C-02C2-4FFC-86FD-D4C9633BD2DE}" type="datetimeFigureOut">
               <a:rPr lang="en-US" smtClean="0"/>
-              <a:t>8/10/2021</a:t>
+              <a:t>8/12/2021</a:t>
             </a:fld>
             <a:endParaRPr lang="en-US"/>
           </a:p>
@@ -907,7 +910,7 @@
           <a:p>
             <a:fld id="{6991779C-02C2-4FFC-86FD-D4C9633BD2DE}" type="datetimeFigureOut">
               <a:rPr lang="en-US" smtClean="0"/>
-              <a:t>8/10/2021</a:t>
+              <a:t>8/12/2021</a:t>
             </a:fld>
             <a:endParaRPr lang="en-US"/>
           </a:p>
@@ -1182,7 +1185,7 @@
           <a:p>
             <a:fld id="{6991779C-02C2-4FFC-86FD-D4C9633BD2DE}" type="datetimeFigureOut">
               <a:rPr lang="en-US" smtClean="0"/>
-              <a:t>8/10/2021</a:t>
+              <a:t>8/12/2021</a:t>
             </a:fld>
             <a:endParaRPr lang="en-US"/>
           </a:p>
@@ -1447,7 +1450,7 @@
           <a:p>
             <a:fld id="{6991779C-02C2-4FFC-86FD-D4C9633BD2DE}" type="datetimeFigureOut">
               <a:rPr lang="en-US" smtClean="0"/>
-              <a:t>8/10/2021</a:t>
+              <a:t>8/12/2021</a:t>
             </a:fld>
             <a:endParaRPr lang="en-US"/>
           </a:p>
@@ -1859,7 +1862,7 @@
           <a:p>
             <a:fld id="{6991779C-02C2-4FFC-86FD-D4C9633BD2DE}" type="datetimeFigureOut">
               <a:rPr lang="en-US" smtClean="0"/>
-              <a:t>8/10/2021</a:t>
+              <a:t>8/12/2021</a:t>
             </a:fld>
             <a:endParaRPr lang="en-US"/>
           </a:p>
@@ -2000,7 +2003,7 @@
           <a:p>
             <a:fld id="{6991779C-02C2-4FFC-86FD-D4C9633BD2DE}" type="datetimeFigureOut">
               <a:rPr lang="en-US" smtClean="0"/>
-              <a:t>8/10/2021</a:t>
+              <a:t>8/12/2021</a:t>
             </a:fld>
             <a:endParaRPr lang="en-US"/>
           </a:p>
@@ -2113,7 +2116,7 @@
           <a:p>
             <a:fld id="{6991779C-02C2-4FFC-86FD-D4C9633BD2DE}" type="datetimeFigureOut">
               <a:rPr lang="en-US" smtClean="0"/>
-              <a:t>8/10/2021</a:t>
+              <a:t>8/12/2021</a:t>
             </a:fld>
             <a:endParaRPr lang="en-US"/>
           </a:p>
@@ -2424,7 +2427,7 @@
           <a:p>
             <a:fld id="{6991779C-02C2-4FFC-86FD-D4C9633BD2DE}" type="datetimeFigureOut">
               <a:rPr lang="en-US" smtClean="0"/>
-              <a:t>8/10/2021</a:t>
+              <a:t>8/12/2021</a:t>
             </a:fld>
             <a:endParaRPr lang="en-US"/>
           </a:p>
@@ -2712,7 +2715,7 @@
           <a:p>
             <a:fld id="{6991779C-02C2-4FFC-86FD-D4C9633BD2DE}" type="datetimeFigureOut">
               <a:rPr lang="en-US" smtClean="0"/>
-              <a:t>8/10/2021</a:t>
+              <a:t>8/12/2021</a:t>
             </a:fld>
             <a:endParaRPr lang="en-US"/>
           </a:p>
@@ -2953,7 +2956,7 @@
           <a:p>
             <a:fld id="{6991779C-02C2-4FFC-86FD-D4C9633BD2DE}" type="datetimeFigureOut">
               <a:rPr lang="en-US" smtClean="0"/>
-              <a:t>8/10/2021</a:t>
+              <a:t>8/12/2021</a:t>
             </a:fld>
             <a:endParaRPr lang="en-US"/>
           </a:p>

</xml_diff>

<commit_message>
Update: BCB for up to 80% incident power, working nicely
</commit_message>
<xml_diff>
--- a/LCLS/Meeting_08-11-2021_2nd_order_phase_plate.pptx
+++ b/LCLS/Meeting_08-11-2021_2nd_order_phase_plate.pptx
@@ -12,7 +12,9 @@
     <p:sldId id="264" r:id="rId6"/>
     <p:sldId id="259" r:id="rId7"/>
     <p:sldId id="265" r:id="rId8"/>
-    <p:sldId id="268" r:id="rId9"/>
+    <p:sldId id="269" r:id="rId9"/>
+    <p:sldId id="270" r:id="rId10"/>
+    <p:sldId id="268" r:id="rId11"/>
   </p:sldIdLst>
   <p:sldSz cx="12192000" cy="6858000"/>
   <p:notesSz cx="6858000" cy="9144000"/>
@@ -135,6 +137,8 @@
           <p14:sldIdLst>
             <p14:sldId id="259"/>
             <p14:sldId id="265"/>
+            <p14:sldId id="269"/>
+            <p14:sldId id="270"/>
             <p14:sldId id="268"/>
           </p14:sldIdLst>
         </p14:section>
@@ -306,7 +310,7 @@
           <a:p>
             <a:fld id="{6991779C-02C2-4FFC-86FD-D4C9633BD2DE}" type="datetimeFigureOut">
               <a:rPr lang="en-US" smtClean="0"/>
-              <a:t>8/12/2021</a:t>
+              <a:t>8/13/2021</a:t>
             </a:fld>
             <a:endParaRPr lang="en-US"/>
           </a:p>
@@ -504,7 +508,7 @@
           <a:p>
             <a:fld id="{6991779C-02C2-4FFC-86FD-D4C9633BD2DE}" type="datetimeFigureOut">
               <a:rPr lang="en-US" smtClean="0"/>
-              <a:t>8/12/2021</a:t>
+              <a:t>8/13/2021</a:t>
             </a:fld>
             <a:endParaRPr lang="en-US"/>
           </a:p>
@@ -712,7 +716,7 @@
           <a:p>
             <a:fld id="{6991779C-02C2-4FFC-86FD-D4C9633BD2DE}" type="datetimeFigureOut">
               <a:rPr lang="en-US" smtClean="0"/>
-              <a:t>8/12/2021</a:t>
+              <a:t>8/13/2021</a:t>
             </a:fld>
             <a:endParaRPr lang="en-US"/>
           </a:p>
@@ -910,7 +914,7 @@
           <a:p>
             <a:fld id="{6991779C-02C2-4FFC-86FD-D4C9633BD2DE}" type="datetimeFigureOut">
               <a:rPr lang="en-US" smtClean="0"/>
-              <a:t>8/12/2021</a:t>
+              <a:t>8/13/2021</a:t>
             </a:fld>
             <a:endParaRPr lang="en-US"/>
           </a:p>
@@ -1185,7 +1189,7 @@
           <a:p>
             <a:fld id="{6991779C-02C2-4FFC-86FD-D4C9633BD2DE}" type="datetimeFigureOut">
               <a:rPr lang="en-US" smtClean="0"/>
-              <a:t>8/12/2021</a:t>
+              <a:t>8/13/2021</a:t>
             </a:fld>
             <a:endParaRPr lang="en-US"/>
           </a:p>
@@ -1450,7 +1454,7 @@
           <a:p>
             <a:fld id="{6991779C-02C2-4FFC-86FD-D4C9633BD2DE}" type="datetimeFigureOut">
               <a:rPr lang="en-US" smtClean="0"/>
-              <a:t>8/12/2021</a:t>
+              <a:t>8/13/2021</a:t>
             </a:fld>
             <a:endParaRPr lang="en-US"/>
           </a:p>
@@ -1862,7 +1866,7 @@
           <a:p>
             <a:fld id="{6991779C-02C2-4FFC-86FD-D4C9633BD2DE}" type="datetimeFigureOut">
               <a:rPr lang="en-US" smtClean="0"/>
-              <a:t>8/12/2021</a:t>
+              <a:t>8/13/2021</a:t>
             </a:fld>
             <a:endParaRPr lang="en-US"/>
           </a:p>
@@ -2003,7 +2007,7 @@
           <a:p>
             <a:fld id="{6991779C-02C2-4FFC-86FD-D4C9633BD2DE}" type="datetimeFigureOut">
               <a:rPr lang="en-US" smtClean="0"/>
-              <a:t>8/12/2021</a:t>
+              <a:t>8/13/2021</a:t>
             </a:fld>
             <a:endParaRPr lang="en-US"/>
           </a:p>
@@ -2116,7 +2120,7 @@
           <a:p>
             <a:fld id="{6991779C-02C2-4FFC-86FD-D4C9633BD2DE}" type="datetimeFigureOut">
               <a:rPr lang="en-US" smtClean="0"/>
-              <a:t>8/12/2021</a:t>
+              <a:t>8/13/2021</a:t>
             </a:fld>
             <a:endParaRPr lang="en-US"/>
           </a:p>
@@ -2427,7 +2431,7 @@
           <a:p>
             <a:fld id="{6991779C-02C2-4FFC-86FD-D4C9633BD2DE}" type="datetimeFigureOut">
               <a:rPr lang="en-US" smtClean="0"/>
-              <a:t>8/12/2021</a:t>
+              <a:t>8/13/2021</a:t>
             </a:fld>
             <a:endParaRPr lang="en-US"/>
           </a:p>
@@ -2715,7 +2719,7 @@
           <a:p>
             <a:fld id="{6991779C-02C2-4FFC-86FD-D4C9633BD2DE}" type="datetimeFigureOut">
               <a:rPr lang="en-US" smtClean="0"/>
-              <a:t>8/12/2021</a:t>
+              <a:t>8/13/2021</a:t>
             </a:fld>
             <a:endParaRPr lang="en-US"/>
           </a:p>
@@ -2956,7 +2960,7 @@
           <a:p>
             <a:fld id="{6991779C-02C2-4FFC-86FD-D4C9633BD2DE}" type="datetimeFigureOut">
               <a:rPr lang="en-US" smtClean="0"/>
-              <a:t>8/12/2021</a:t>
+              <a:t>8/13/2021</a:t>
             </a:fld>
             <a:endParaRPr lang="en-US"/>
           </a:p>
@@ -3558,6 +3562,117 @@
 </p:sld>
 </file>
 
+<file path=ppt/slides/slide10.xml><?xml version="1.0" encoding="utf-8"?>
+<p:sld xmlns:a="http://schemas.openxmlformats.org/drawingml/2006/main" xmlns:r="http://schemas.openxmlformats.org/officeDocument/2006/relationships" xmlns:p="http://schemas.openxmlformats.org/presentationml/2006/main">
+  <p:cSld>
+    <p:spTree>
+      <p:nvGrpSpPr>
+        <p:cNvPr id="1" name=""/>
+        <p:cNvGrpSpPr/>
+        <p:nvPr/>
+      </p:nvGrpSpPr>
+      <p:grpSpPr>
+        <a:xfrm>
+          <a:off x="0" y="0"/>
+          <a:ext cx="0" cy="0"/>
+          <a:chOff x="0" y="0"/>
+          <a:chExt cx="0" cy="0"/>
+        </a:xfrm>
+      </p:grpSpPr>
+      <p:sp>
+        <p:nvSpPr>
+          <p:cNvPr id="2" name="Title 1">
+            <a:extLst>
+              <a:ext uri="{FF2B5EF4-FFF2-40B4-BE49-F238E27FC236}">
+                <a16:creationId xmlns:a16="http://schemas.microsoft.com/office/drawing/2014/main" id="{F3D7DCA8-E557-42CB-8101-C0803E191E66}"/>
+              </a:ext>
+            </a:extLst>
+          </p:cNvPr>
+          <p:cNvSpPr>
+            <a:spLocks noGrp="1"/>
+          </p:cNvSpPr>
+          <p:nvPr>
+            <p:ph type="title"/>
+          </p:nvPr>
+        </p:nvSpPr>
+        <p:spPr/>
+        <p:txBody>
+          <a:bodyPr/>
+          <a:lstStyle/>
+          <a:p>
+            <a:r>
+              <a:rPr lang="en-US" dirty="0"/>
+              <a:t>To-do</a:t>
+            </a:r>
+          </a:p>
+        </p:txBody>
+      </p:sp>
+      <p:sp>
+        <p:nvSpPr>
+          <p:cNvPr id="3" name="Content Placeholder 2">
+            <a:extLst>
+              <a:ext uri="{FF2B5EF4-FFF2-40B4-BE49-F238E27FC236}">
+                <a16:creationId xmlns:a16="http://schemas.microsoft.com/office/drawing/2014/main" id="{25ED7480-5651-4D66-A26D-9A8B2F5DEEBC}"/>
+              </a:ext>
+            </a:extLst>
+          </p:cNvPr>
+          <p:cNvSpPr>
+            <a:spLocks noGrp="1"/>
+          </p:cNvSpPr>
+          <p:nvPr>
+            <p:ph idx="1"/>
+          </p:nvPr>
+        </p:nvSpPr>
+        <p:spPr/>
+        <p:txBody>
+          <a:bodyPr/>
+          <a:lstStyle/>
+          <a:p>
+            <a:r>
+              <a:rPr lang="en-US" dirty="0"/>
+              <a:t>Bending – 2</a:t>
+            </a:r>
+            <a:r>
+              <a:rPr lang="en-US" baseline="30000" dirty="0"/>
+              <a:t>nd</a:t>
+            </a:r>
+            <a:r>
+              <a:rPr lang="en-US" dirty="0"/>
+              <a:t> order terms, then scan m2_p again</a:t>
+            </a:r>
+          </a:p>
+          <a:p>
+            <a:endParaRPr lang="en-US" dirty="0"/>
+          </a:p>
+          <a:p>
+            <a:r>
+              <a:rPr lang="en-US" dirty="0"/>
+              <a:t>If m2_p bending doesn’t fix this, put in a known phase error and do it without </a:t>
+            </a:r>
+            <a:r>
+              <a:rPr lang="en-US" dirty="0" err="1"/>
+              <a:t>heatbumps</a:t>
+            </a:r>
+            <a:r>
+              <a:rPr lang="en-US" dirty="0"/>
+              <a:t> to see if we can undo the introduced phase error with a phase corrector</a:t>
+            </a:r>
+          </a:p>
+        </p:txBody>
+      </p:sp>
+    </p:spTree>
+    <p:extLst>
+      <p:ext uri="{BB962C8B-B14F-4D97-AF65-F5344CB8AC3E}">
+        <p14:creationId xmlns:p14="http://schemas.microsoft.com/office/powerpoint/2010/main" val="515611632"/>
+      </p:ext>
+    </p:extLst>
+  </p:cSld>
+  <p:clrMapOvr>
+    <a:masterClrMapping/>
+  </p:clrMapOvr>
+</p:sld>
+</file>
+
 <file path=ppt/slides/slide2.xml><?xml version="1.0" encoding="utf-8"?>
 <p:sld xmlns:a="http://schemas.openxmlformats.org/drawingml/2006/main" xmlns:r="http://schemas.openxmlformats.org/officeDocument/2006/relationships" xmlns:p="http://schemas.openxmlformats.org/presentationml/2006/main">
   <p:cSld>
@@ -6230,7 +6345,7 @@
           <p:cNvPr id="2" name="Title 1">
             <a:extLst>
               <a:ext uri="{FF2B5EF4-FFF2-40B4-BE49-F238E27FC236}">
-                <a16:creationId xmlns:a16="http://schemas.microsoft.com/office/drawing/2014/main" id="{F3D7DCA8-E557-42CB-8101-C0803E191E66}"/>
+                <a16:creationId xmlns:a16="http://schemas.microsoft.com/office/drawing/2014/main" id="{260D5609-81F0-4E66-9577-5DB96C9A4396}"/>
               </a:ext>
             </a:extLst>
           </p:cNvPr>
@@ -6248,17 +6363,490 @@
           <a:p>
             <a:r>
               <a:rPr lang="en-US" dirty="0"/>
-              <a:t>To-do</a:t>
-            </a:r>
-          </a:p>
-        </p:txBody>
-      </p:sp>
-      <p:sp>
-        <p:nvSpPr>
-          <p:cNvPr id="3" name="Content Placeholder 2">
-            <a:extLst>
-              <a:ext uri="{FF2B5EF4-FFF2-40B4-BE49-F238E27FC236}">
-                <a16:creationId xmlns:a16="http://schemas.microsoft.com/office/drawing/2014/main" id="{25ED7480-5651-4D66-A26D-9A8B2F5DEEBC}"/>
+              <a:t>Bending after phase corrector</a:t>
+            </a:r>
+          </a:p>
+        </p:txBody>
+      </p:sp>
+      <p:pic>
+        <p:nvPicPr>
+          <p:cNvPr id="4" name="Picture 3">
+            <a:extLst>
+              <a:ext uri="{FF2B5EF4-FFF2-40B4-BE49-F238E27FC236}">
+                <a16:creationId xmlns:a16="http://schemas.microsoft.com/office/drawing/2014/main" id="{F655CADF-A43A-4A2A-96A1-DB971A183AB0}"/>
+              </a:ext>
+            </a:extLst>
+          </p:cNvPr>
+          <p:cNvPicPr>
+            <a:picLocks noChangeAspect="1"/>
+          </p:cNvPicPr>
+          <p:nvPr/>
+        </p:nvPicPr>
+        <p:blipFill>
+          <a:blip r:embed="rId2">
+            <a:extLst>
+              <a:ext uri="{28A0092B-C50C-407E-A947-70E740481C1C}">
+                <a14:useLocalDpi xmlns:a14="http://schemas.microsoft.com/office/drawing/2010/main" val="0"/>
+              </a:ext>
+            </a:extLst>
+          </a:blip>
+          <a:srcRect/>
+          <a:stretch/>
+        </p:blipFill>
+        <p:spPr>
+          <a:xfrm>
+            <a:off x="3160759" y="3888441"/>
+            <a:ext cx="2743200" cy="2743200"/>
+          </a:xfrm>
+          <a:prstGeom prst="rect">
+            <a:avLst/>
+          </a:prstGeom>
+        </p:spPr>
+      </p:pic>
+      <p:grpSp>
+        <p:nvGrpSpPr>
+          <p:cNvPr id="5" name="Group 4">
+            <a:extLst>
+              <a:ext uri="{FF2B5EF4-FFF2-40B4-BE49-F238E27FC236}">
+                <a16:creationId xmlns:a16="http://schemas.microsoft.com/office/drawing/2014/main" id="{D52B075D-3A35-49E8-BCAE-4C048C821A7C}"/>
+              </a:ext>
+            </a:extLst>
+          </p:cNvPr>
+          <p:cNvGrpSpPr/>
+          <p:nvPr/>
+        </p:nvGrpSpPr>
+        <p:grpSpPr>
+          <a:xfrm>
+            <a:off x="3160759" y="1261782"/>
+            <a:ext cx="2743200" cy="2743200"/>
+            <a:chOff x="8691284" y="1261782"/>
+            <a:chExt cx="2743200" cy="2743200"/>
+          </a:xfrm>
+        </p:grpSpPr>
+        <p:pic>
+          <p:nvPicPr>
+            <p:cNvPr id="6" name="Picture 5">
+              <a:extLst>
+                <a:ext uri="{FF2B5EF4-FFF2-40B4-BE49-F238E27FC236}">
+                  <a16:creationId xmlns:a16="http://schemas.microsoft.com/office/drawing/2014/main" id="{BC94AE03-165F-41B0-9651-26480729DE07}"/>
+                </a:ext>
+              </a:extLst>
+            </p:cNvPr>
+            <p:cNvPicPr>
+              <a:picLocks noChangeAspect="1"/>
+            </p:cNvPicPr>
+            <p:nvPr/>
+          </p:nvPicPr>
+          <p:blipFill>
+            <a:blip r:embed="rId3">
+              <a:extLst>
+                <a:ext uri="{28A0092B-C50C-407E-A947-70E740481C1C}">
+                  <a14:useLocalDpi xmlns:a14="http://schemas.microsoft.com/office/drawing/2010/main" val="0"/>
+                </a:ext>
+              </a:extLst>
+            </a:blip>
+            <a:srcRect/>
+            <a:stretch/>
+          </p:blipFill>
+          <p:spPr>
+            <a:xfrm>
+              <a:off x="8691284" y="1261782"/>
+              <a:ext cx="2743200" cy="2743200"/>
+            </a:xfrm>
+            <a:prstGeom prst="rect">
+              <a:avLst/>
+            </a:prstGeom>
+          </p:spPr>
+        </p:pic>
+        <p:sp>
+          <p:nvSpPr>
+            <p:cNvPr id="7" name="TextBox 6">
+              <a:extLst>
+                <a:ext uri="{FF2B5EF4-FFF2-40B4-BE49-F238E27FC236}">
+                  <a16:creationId xmlns:a16="http://schemas.microsoft.com/office/drawing/2014/main" id="{4EED6E70-E343-4006-888F-B4FBFE7CE19D}"/>
+                </a:ext>
+              </a:extLst>
+            </p:cNvPr>
+            <p:cNvSpPr txBox="1"/>
+            <p:nvPr/>
+          </p:nvSpPr>
+          <p:spPr>
+            <a:xfrm>
+              <a:off x="8961236" y="2736666"/>
+              <a:ext cx="1101648" cy="369332"/>
+            </a:xfrm>
+            <a:prstGeom prst="rect">
+              <a:avLst/>
+            </a:prstGeom>
+            <a:noFill/>
+          </p:spPr>
+          <p:txBody>
+            <a:bodyPr wrap="none" rtlCol="0">
+              <a:spAutoFit/>
+            </a:bodyPr>
+            <a:lstStyle/>
+            <a:p>
+              <a:r>
+                <a:rPr lang="en-US" altLang="zh-CN" dirty="0">
+                  <a:solidFill>
+                    <a:schemeClr val="bg1"/>
+                  </a:solidFill>
+                </a:rPr>
+                <a:t>-2</a:t>
+              </a:r>
+              <a:r>
+                <a:rPr lang="en-US" altLang="zh-CN" baseline="30000" dirty="0">
+                  <a:solidFill>
+                    <a:schemeClr val="bg1"/>
+                  </a:solidFill>
+                </a:rPr>
+                <a:t>nd</a:t>
+              </a:r>
+              <a:r>
+                <a:rPr lang="en-US" altLang="zh-CN" dirty="0">
+                  <a:solidFill>
+                    <a:schemeClr val="bg1"/>
+                  </a:solidFill>
+                </a:rPr>
+                <a:t> order</a:t>
+              </a:r>
+              <a:endParaRPr lang="en-US" dirty="0">
+                <a:solidFill>
+                  <a:schemeClr val="bg1"/>
+                </a:solidFill>
+              </a:endParaRPr>
+            </a:p>
+          </p:txBody>
+        </p:sp>
+      </p:grpSp>
+      <p:pic>
+        <p:nvPicPr>
+          <p:cNvPr id="8" name="Picture 7">
+            <a:extLst>
+              <a:ext uri="{FF2B5EF4-FFF2-40B4-BE49-F238E27FC236}">
+                <a16:creationId xmlns:a16="http://schemas.microsoft.com/office/drawing/2014/main" id="{A6031978-3C67-4354-BCCC-889ADBB5EAD9}"/>
+              </a:ext>
+            </a:extLst>
+          </p:cNvPr>
+          <p:cNvPicPr>
+            <a:picLocks noChangeAspect="1"/>
+          </p:cNvPicPr>
+          <p:nvPr/>
+        </p:nvPicPr>
+        <p:blipFill>
+          <a:blip r:embed="rId4">
+            <a:extLst>
+              <a:ext uri="{28A0092B-C50C-407E-A947-70E740481C1C}">
+                <a14:useLocalDpi xmlns:a14="http://schemas.microsoft.com/office/drawing/2010/main" val="0"/>
+              </a:ext>
+            </a:extLst>
+          </a:blip>
+          <a:srcRect/>
+          <a:stretch/>
+        </p:blipFill>
+        <p:spPr>
+          <a:xfrm>
+            <a:off x="142879" y="3888441"/>
+            <a:ext cx="2743200" cy="2743200"/>
+          </a:xfrm>
+          <a:prstGeom prst="rect">
+            <a:avLst/>
+          </a:prstGeom>
+        </p:spPr>
+      </p:pic>
+      <p:grpSp>
+        <p:nvGrpSpPr>
+          <p:cNvPr id="9" name="Group 8">
+            <a:extLst>
+              <a:ext uri="{FF2B5EF4-FFF2-40B4-BE49-F238E27FC236}">
+                <a16:creationId xmlns:a16="http://schemas.microsoft.com/office/drawing/2014/main" id="{03AB9937-7FCD-49A5-9C70-3C36875E1CDD}"/>
+              </a:ext>
+            </a:extLst>
+          </p:cNvPr>
+          <p:cNvGrpSpPr/>
+          <p:nvPr/>
+        </p:nvGrpSpPr>
+        <p:grpSpPr>
+          <a:xfrm>
+            <a:off x="246528" y="1261782"/>
+            <a:ext cx="2743200" cy="2743200"/>
+            <a:chOff x="246528" y="1261782"/>
+            <a:chExt cx="2743200" cy="2743200"/>
+          </a:xfrm>
+        </p:grpSpPr>
+        <p:pic>
+          <p:nvPicPr>
+            <p:cNvPr id="10" name="Picture 9" descr="Text&#10;&#10;Description automatically generated with low confidence">
+              <a:extLst>
+                <a:ext uri="{FF2B5EF4-FFF2-40B4-BE49-F238E27FC236}">
+                  <a16:creationId xmlns:a16="http://schemas.microsoft.com/office/drawing/2014/main" id="{9B3AB4AD-2079-43C9-9BF7-EBDCC361E2B7}"/>
+                </a:ext>
+              </a:extLst>
+            </p:cNvPr>
+            <p:cNvPicPr>
+              <a:picLocks noChangeAspect="1"/>
+            </p:cNvPicPr>
+            <p:nvPr/>
+          </p:nvPicPr>
+          <p:blipFill>
+            <a:blip r:embed="rId5">
+              <a:extLst>
+                <a:ext uri="{28A0092B-C50C-407E-A947-70E740481C1C}">
+                  <a14:useLocalDpi xmlns:a14="http://schemas.microsoft.com/office/drawing/2010/main" val="0"/>
+                </a:ext>
+              </a:extLst>
+            </a:blip>
+            <a:stretch>
+              <a:fillRect/>
+            </a:stretch>
+          </p:blipFill>
+          <p:spPr>
+            <a:xfrm>
+              <a:off x="246528" y="1261782"/>
+              <a:ext cx="2743200" cy="2743200"/>
+            </a:xfrm>
+            <a:prstGeom prst="rect">
+              <a:avLst/>
+            </a:prstGeom>
+          </p:spPr>
+        </p:pic>
+        <p:sp>
+          <p:nvSpPr>
+            <p:cNvPr id="11" name="TextBox 10">
+              <a:extLst>
+                <a:ext uri="{FF2B5EF4-FFF2-40B4-BE49-F238E27FC236}">
+                  <a16:creationId xmlns:a16="http://schemas.microsoft.com/office/drawing/2014/main" id="{2CCFB030-DA80-48C5-AD5C-7482356E5CC2}"/>
+                </a:ext>
+              </a:extLst>
+            </p:cNvPr>
+            <p:cNvSpPr txBox="1"/>
+            <p:nvPr/>
+          </p:nvSpPr>
+          <p:spPr>
+            <a:xfrm>
+              <a:off x="521208" y="2736666"/>
+              <a:ext cx="856966" cy="369332"/>
+            </a:xfrm>
+            <a:prstGeom prst="rect">
+              <a:avLst/>
+            </a:prstGeom>
+            <a:noFill/>
+          </p:spPr>
+          <p:txBody>
+            <a:bodyPr wrap="none" rtlCol="0">
+              <a:spAutoFit/>
+            </a:bodyPr>
+            <a:lstStyle/>
+            <a:p>
+              <a:r>
+                <a:rPr lang="en-US" altLang="zh-CN" dirty="0">
+                  <a:solidFill>
+                    <a:schemeClr val="bg1"/>
+                  </a:solidFill>
+                </a:rPr>
+                <a:t>perfect</a:t>
+              </a:r>
+              <a:endParaRPr lang="en-US" dirty="0">
+                <a:solidFill>
+                  <a:schemeClr val="bg1"/>
+                </a:solidFill>
+              </a:endParaRPr>
+            </a:p>
+          </p:txBody>
+        </p:sp>
+      </p:grpSp>
+      <p:pic>
+        <p:nvPicPr>
+          <p:cNvPr id="12" name="Picture 11">
+            <a:extLst>
+              <a:ext uri="{FF2B5EF4-FFF2-40B4-BE49-F238E27FC236}">
+                <a16:creationId xmlns:a16="http://schemas.microsoft.com/office/drawing/2014/main" id="{EA7EA4F2-5457-41E1-AD09-11071E9F642D}"/>
+              </a:ext>
+            </a:extLst>
+          </p:cNvPr>
+          <p:cNvPicPr>
+            <a:picLocks noChangeAspect="1"/>
+          </p:cNvPicPr>
+          <p:nvPr/>
+        </p:nvPicPr>
+        <p:blipFill>
+          <a:blip r:embed="rId6">
+            <a:extLst>
+              <a:ext uri="{28A0092B-C50C-407E-A947-70E740481C1C}">
+                <a14:useLocalDpi xmlns:a14="http://schemas.microsoft.com/office/drawing/2010/main" val="0"/>
+              </a:ext>
+            </a:extLst>
+          </a:blip>
+          <a:srcRect/>
+          <a:stretch/>
+        </p:blipFill>
+        <p:spPr>
+          <a:xfrm>
+            <a:off x="6074990" y="3888441"/>
+            <a:ext cx="2743200" cy="2743200"/>
+          </a:xfrm>
+          <a:prstGeom prst="rect">
+            <a:avLst/>
+          </a:prstGeom>
+        </p:spPr>
+      </p:pic>
+      <p:grpSp>
+        <p:nvGrpSpPr>
+          <p:cNvPr id="13" name="Group 12">
+            <a:extLst>
+              <a:ext uri="{FF2B5EF4-FFF2-40B4-BE49-F238E27FC236}">
+                <a16:creationId xmlns:a16="http://schemas.microsoft.com/office/drawing/2014/main" id="{241EA841-931D-4C85-9A48-5DEFA183D439}"/>
+              </a:ext>
+            </a:extLst>
+          </p:cNvPr>
+          <p:cNvGrpSpPr/>
+          <p:nvPr/>
+        </p:nvGrpSpPr>
+        <p:grpSpPr>
+          <a:xfrm>
+            <a:off x="6178639" y="1261782"/>
+            <a:ext cx="2743200" cy="2743200"/>
+            <a:chOff x="246528" y="1261782"/>
+            <a:chExt cx="2743200" cy="2743200"/>
+          </a:xfrm>
+        </p:grpSpPr>
+        <p:pic>
+          <p:nvPicPr>
+            <p:cNvPr id="14" name="Picture 13">
+              <a:extLst>
+                <a:ext uri="{FF2B5EF4-FFF2-40B4-BE49-F238E27FC236}">
+                  <a16:creationId xmlns:a16="http://schemas.microsoft.com/office/drawing/2014/main" id="{985B9D67-973B-4F21-921A-9A35DE7D8DBC}"/>
+                </a:ext>
+              </a:extLst>
+            </p:cNvPr>
+            <p:cNvPicPr>
+              <a:picLocks noChangeAspect="1"/>
+            </p:cNvPicPr>
+            <p:nvPr/>
+          </p:nvPicPr>
+          <p:blipFill>
+            <a:blip r:embed="rId7">
+              <a:extLst>
+                <a:ext uri="{28A0092B-C50C-407E-A947-70E740481C1C}">
+                  <a14:useLocalDpi xmlns:a14="http://schemas.microsoft.com/office/drawing/2010/main" val="0"/>
+                </a:ext>
+              </a:extLst>
+            </a:blip>
+            <a:srcRect/>
+            <a:stretch/>
+          </p:blipFill>
+          <p:spPr>
+            <a:xfrm>
+              <a:off x="246528" y="1261782"/>
+              <a:ext cx="2743200" cy="2743200"/>
+            </a:xfrm>
+            <a:prstGeom prst="rect">
+              <a:avLst/>
+            </a:prstGeom>
+          </p:spPr>
+        </p:pic>
+        <p:sp>
+          <p:nvSpPr>
+            <p:cNvPr id="15" name="TextBox 14">
+              <a:extLst>
+                <a:ext uri="{FF2B5EF4-FFF2-40B4-BE49-F238E27FC236}">
+                  <a16:creationId xmlns:a16="http://schemas.microsoft.com/office/drawing/2014/main" id="{18939865-0B48-4F23-A474-EFA873764EF9}"/>
+                </a:ext>
+              </a:extLst>
+            </p:cNvPr>
+            <p:cNvSpPr txBox="1"/>
+            <p:nvPr/>
+          </p:nvSpPr>
+          <p:spPr>
+            <a:xfrm>
+              <a:off x="539496" y="2453988"/>
+              <a:ext cx="1154547" cy="646331"/>
+            </a:xfrm>
+            <a:prstGeom prst="rect">
+              <a:avLst/>
+            </a:prstGeom>
+            <a:noFill/>
+          </p:spPr>
+          <p:txBody>
+            <a:bodyPr wrap="none" rtlCol="0">
+              <a:spAutoFit/>
+            </a:bodyPr>
+            <a:lstStyle/>
+            <a:p>
+              <a:r>
+                <a:rPr lang="en-US" altLang="zh-CN" dirty="0">
+                  <a:solidFill>
+                    <a:schemeClr val="bg1"/>
+                  </a:solidFill>
+                </a:rPr>
+                <a:t>-2</a:t>
+              </a:r>
+              <a:r>
+                <a:rPr lang="en-US" altLang="zh-CN" baseline="30000" dirty="0">
+                  <a:solidFill>
+                    <a:schemeClr val="bg1"/>
+                  </a:solidFill>
+                </a:rPr>
+                <a:t>nd</a:t>
+              </a:r>
+              <a:r>
+                <a:rPr lang="en-US" altLang="zh-CN" dirty="0">
+                  <a:solidFill>
+                    <a:schemeClr val="bg1"/>
+                  </a:solidFill>
+                </a:rPr>
+                <a:t> order </a:t>
+              </a:r>
+            </a:p>
+            <a:p>
+              <a:r>
+                <a:rPr lang="en-US" dirty="0">
+                  <a:solidFill>
+                    <a:schemeClr val="bg1"/>
+                  </a:solidFill>
+                </a:rPr>
+                <a:t>+ bending</a:t>
+              </a:r>
+            </a:p>
+          </p:txBody>
+        </p:sp>
+      </p:grpSp>
+    </p:spTree>
+    <p:extLst>
+      <p:ext uri="{BB962C8B-B14F-4D97-AF65-F5344CB8AC3E}">
+        <p14:creationId xmlns:p14="http://schemas.microsoft.com/office/powerpoint/2010/main" val="3597486426"/>
+      </p:ext>
+    </p:extLst>
+  </p:cSld>
+  <p:clrMapOvr>
+    <a:masterClrMapping/>
+  </p:clrMapOvr>
+</p:sld>
+</file>
+
+<file path=ppt/slides/slide9.xml><?xml version="1.0" encoding="utf-8"?>
+<p:sld xmlns:a="http://schemas.openxmlformats.org/drawingml/2006/main" xmlns:r="http://schemas.openxmlformats.org/officeDocument/2006/relationships" xmlns:p="http://schemas.openxmlformats.org/presentationml/2006/main">
+  <p:cSld>
+    <p:spTree>
+      <p:nvGrpSpPr>
+        <p:cNvPr id="1" name=""/>
+        <p:cNvGrpSpPr/>
+        <p:nvPr/>
+      </p:nvGrpSpPr>
+      <p:grpSpPr>
+        <a:xfrm>
+          <a:off x="0" y="0"/>
+          <a:ext cx="0" cy="0"/>
+          <a:chOff x="0" y="0"/>
+          <a:chExt cx="0" cy="0"/>
+        </a:xfrm>
+      </p:grpSpPr>
+      <p:sp>
+        <p:nvSpPr>
+          <p:cNvPr id="2" name="Title 1">
+            <a:extLst>
+              <a:ext uri="{FF2B5EF4-FFF2-40B4-BE49-F238E27FC236}">
+                <a16:creationId xmlns:a16="http://schemas.microsoft.com/office/drawing/2014/main" id="{F38DA7F9-E5D5-441B-916C-7669032AA08E}"/>
               </a:ext>
             </a:extLst>
           </p:cNvPr>
@@ -6266,7 +6854,7 @@
             <a:spLocks noGrp="1"/>
           </p:cNvSpPr>
           <p:nvPr>
-            <p:ph idx="1"/>
+            <p:ph type="title"/>
           </p:nvPr>
         </p:nvSpPr>
         <p:spPr/>
@@ -6275,41 +6863,528 @@
           <a:lstStyle/>
           <a:p>
             <a:r>
+              <a:rPr lang="en-US" altLang="zh-CN" dirty="0"/>
+              <a:t>output</a:t>
+            </a:r>
+            <a:br>
               <a:rPr lang="en-US" dirty="0"/>
-              <a:t>Bending – 2</a:t>
-            </a:r>
-            <a:r>
-              <a:rPr lang="en-US" baseline="30000" dirty="0"/>
-              <a:t>nd</a:t>
-            </a:r>
+            </a:br>
+            <a:endParaRPr lang="en-US" dirty="0"/>
+          </a:p>
+        </p:txBody>
+      </p:sp>
+      <p:pic>
+        <p:nvPicPr>
+          <p:cNvPr id="7" name="Picture 6">
+            <a:extLst>
+              <a:ext uri="{FF2B5EF4-FFF2-40B4-BE49-F238E27FC236}">
+                <a16:creationId xmlns:a16="http://schemas.microsoft.com/office/drawing/2014/main" id="{ACFC2E04-0B1C-4ED6-9EEA-BF1635A3307A}"/>
+              </a:ext>
+            </a:extLst>
+          </p:cNvPr>
+          <p:cNvPicPr>
+            <a:picLocks noChangeAspect="1"/>
+          </p:cNvPicPr>
+          <p:nvPr/>
+        </p:nvPicPr>
+        <p:blipFill>
+          <a:blip r:embed="rId2">
+            <a:extLst>
+              <a:ext uri="{28A0092B-C50C-407E-A947-70E740481C1C}">
+                <a14:useLocalDpi xmlns:a14="http://schemas.microsoft.com/office/drawing/2010/main" val="0"/>
+              </a:ext>
+            </a:extLst>
+          </a:blip>
+          <a:srcRect/>
+          <a:stretch/>
+        </p:blipFill>
+        <p:spPr>
+          <a:xfrm>
+            <a:off x="224791" y="3899826"/>
+            <a:ext cx="2743200" cy="2743200"/>
+          </a:xfrm>
+          <a:prstGeom prst="rect">
+            <a:avLst/>
+          </a:prstGeom>
+        </p:spPr>
+      </p:pic>
+      <p:sp>
+        <p:nvSpPr>
+          <p:cNvPr id="15" name="TextBox 14">
+            <a:extLst>
+              <a:ext uri="{FF2B5EF4-FFF2-40B4-BE49-F238E27FC236}">
+                <a16:creationId xmlns:a16="http://schemas.microsoft.com/office/drawing/2014/main" id="{F731A8C6-4421-4718-BCD2-F6A1F446540E}"/>
+              </a:ext>
+            </a:extLst>
+          </p:cNvPr>
+          <p:cNvSpPr txBox="1"/>
+          <p:nvPr/>
+        </p:nvSpPr>
+        <p:spPr>
+          <a:xfrm>
+            <a:off x="273423" y="1027906"/>
+            <a:ext cx="793294" cy="369332"/>
+          </a:xfrm>
+          <a:prstGeom prst="rect">
+            <a:avLst/>
+          </a:prstGeom>
+          <a:noFill/>
+        </p:spPr>
+        <p:txBody>
+          <a:bodyPr wrap="none" rtlCol="0">
+            <a:spAutoFit/>
+          </a:bodyPr>
+          <a:lstStyle/>
+          <a:p>
+            <a:r>
+              <a:rPr lang="en-US" altLang="zh-CN" dirty="0"/>
+              <a:t>Profile</a:t>
+            </a:r>
+            <a:endParaRPr lang="en-US" dirty="0"/>
+          </a:p>
+        </p:txBody>
+      </p:sp>
+      <p:sp>
+        <p:nvSpPr>
+          <p:cNvPr id="16" name="TextBox 15">
+            <a:extLst>
+              <a:ext uri="{FF2B5EF4-FFF2-40B4-BE49-F238E27FC236}">
+                <a16:creationId xmlns:a16="http://schemas.microsoft.com/office/drawing/2014/main" id="{D8862E1C-8D7C-4393-B3C4-BF5875052490}"/>
+              </a:ext>
+            </a:extLst>
+          </p:cNvPr>
+          <p:cNvSpPr txBox="1"/>
+          <p:nvPr/>
+        </p:nvSpPr>
+        <p:spPr>
+          <a:xfrm>
+            <a:off x="246528" y="6446975"/>
+            <a:ext cx="1755096" cy="369332"/>
+          </a:xfrm>
+          <a:prstGeom prst="rect">
+            <a:avLst/>
+          </a:prstGeom>
+          <a:noFill/>
+        </p:spPr>
+        <p:txBody>
+          <a:bodyPr wrap="none" rtlCol="0">
+            <a:spAutoFit/>
+          </a:bodyPr>
+          <a:lstStyle/>
+          <a:p>
             <a:r>
               <a:rPr lang="en-US" dirty="0"/>
-              <a:t> order terms, then scan m2_p again</a:t>
-            </a:r>
-          </a:p>
-          <a:p>
-            <a:endParaRPr lang="en-US" dirty="0"/>
-          </a:p>
-          <a:p>
-            <a:r>
-              <a:rPr lang="en-US" dirty="0"/>
-              <a:t>If m2_p bending doesn’t fix this, put in a known phase error and do it without </a:t>
-            </a:r>
-            <a:r>
-              <a:rPr lang="en-US" dirty="0" err="1"/>
-              <a:t>heatbumps</a:t>
-            </a:r>
-            <a:r>
-              <a:rPr lang="en-US" dirty="0"/>
-              <a:t> to see if we can undo the introduced phase error with a phase corrector</a:t>
-            </a:r>
-          </a:p>
-        </p:txBody>
-      </p:sp>
+              <a:t>Spatial spectrum</a:t>
+            </a:r>
+          </a:p>
+        </p:txBody>
+      </p:sp>
+      <p:pic>
+        <p:nvPicPr>
+          <p:cNvPr id="18" name="Picture 17">
+            <a:extLst>
+              <a:ext uri="{FF2B5EF4-FFF2-40B4-BE49-F238E27FC236}">
+                <a16:creationId xmlns:a16="http://schemas.microsoft.com/office/drawing/2014/main" id="{D6D057C2-614B-410C-AAE4-7C34F6413D88}"/>
+              </a:ext>
+            </a:extLst>
+          </p:cNvPr>
+          <p:cNvPicPr>
+            <a:picLocks noChangeAspect="1"/>
+          </p:cNvPicPr>
+          <p:nvPr/>
+        </p:nvPicPr>
+        <p:blipFill>
+          <a:blip r:embed="rId3">
+            <a:extLst>
+              <a:ext uri="{28A0092B-C50C-407E-A947-70E740481C1C}">
+                <a14:useLocalDpi xmlns:a14="http://schemas.microsoft.com/office/drawing/2010/main" val="0"/>
+              </a:ext>
+            </a:extLst>
+          </a:blip>
+          <a:srcRect/>
+          <a:stretch/>
+        </p:blipFill>
+        <p:spPr>
+          <a:xfrm>
+            <a:off x="2989728" y="3899826"/>
+            <a:ext cx="2743200" cy="2743200"/>
+          </a:xfrm>
+          <a:prstGeom prst="rect">
+            <a:avLst/>
+          </a:prstGeom>
+        </p:spPr>
+      </p:pic>
+      <p:grpSp>
+        <p:nvGrpSpPr>
+          <p:cNvPr id="3" name="Group 2">
+            <a:extLst>
+              <a:ext uri="{FF2B5EF4-FFF2-40B4-BE49-F238E27FC236}">
+                <a16:creationId xmlns:a16="http://schemas.microsoft.com/office/drawing/2014/main" id="{7E9E7FBA-BDA5-4EFD-B03E-6705A8132395}"/>
+              </a:ext>
+            </a:extLst>
+          </p:cNvPr>
+          <p:cNvGrpSpPr/>
+          <p:nvPr/>
+        </p:nvGrpSpPr>
+        <p:grpSpPr>
+          <a:xfrm>
+            <a:off x="273423" y="1261782"/>
+            <a:ext cx="2743200" cy="2743200"/>
+            <a:chOff x="246528" y="1261782"/>
+            <a:chExt cx="2743200" cy="2743200"/>
+          </a:xfrm>
+        </p:grpSpPr>
+        <p:pic>
+          <p:nvPicPr>
+            <p:cNvPr id="8" name="Picture 7">
+              <a:extLst>
+                <a:ext uri="{FF2B5EF4-FFF2-40B4-BE49-F238E27FC236}">
+                  <a16:creationId xmlns:a16="http://schemas.microsoft.com/office/drawing/2014/main" id="{A15B26DE-B033-4E81-B83E-9C46AF294457}"/>
+                </a:ext>
+              </a:extLst>
+            </p:cNvPr>
+            <p:cNvPicPr>
+              <a:picLocks noChangeAspect="1"/>
+            </p:cNvPicPr>
+            <p:nvPr/>
+          </p:nvPicPr>
+          <p:blipFill>
+            <a:blip r:embed="rId4">
+              <a:extLst>
+                <a:ext uri="{28A0092B-C50C-407E-A947-70E740481C1C}">
+                  <a14:useLocalDpi xmlns:a14="http://schemas.microsoft.com/office/drawing/2010/main" val="0"/>
+                </a:ext>
+              </a:extLst>
+            </a:blip>
+            <a:srcRect/>
+            <a:stretch/>
+          </p:blipFill>
+          <p:spPr>
+            <a:xfrm>
+              <a:off x="246528" y="1261782"/>
+              <a:ext cx="2743200" cy="2743200"/>
+            </a:xfrm>
+            <a:prstGeom prst="rect">
+              <a:avLst/>
+            </a:prstGeom>
+          </p:spPr>
+        </p:pic>
+        <p:sp>
+          <p:nvSpPr>
+            <p:cNvPr id="19" name="TextBox 18">
+              <a:extLst>
+                <a:ext uri="{FF2B5EF4-FFF2-40B4-BE49-F238E27FC236}">
+                  <a16:creationId xmlns:a16="http://schemas.microsoft.com/office/drawing/2014/main" id="{BA679CA1-F3CF-44C2-BF65-E9289EA7061D}"/>
+                </a:ext>
+              </a:extLst>
+            </p:cNvPr>
+            <p:cNvSpPr txBox="1"/>
+            <p:nvPr/>
+          </p:nvSpPr>
+          <p:spPr>
+            <a:xfrm>
+              <a:off x="530352" y="2775252"/>
+              <a:ext cx="856966" cy="369332"/>
+            </a:xfrm>
+            <a:prstGeom prst="rect">
+              <a:avLst/>
+            </a:prstGeom>
+            <a:noFill/>
+          </p:spPr>
+          <p:txBody>
+            <a:bodyPr wrap="none" rtlCol="0">
+              <a:spAutoFit/>
+            </a:bodyPr>
+            <a:lstStyle/>
+            <a:p>
+              <a:r>
+                <a:rPr lang="en-US" altLang="zh-CN" dirty="0">
+                  <a:solidFill>
+                    <a:schemeClr val="bg1"/>
+                  </a:solidFill>
+                </a:rPr>
+                <a:t>perfect</a:t>
+              </a:r>
+              <a:endParaRPr lang="en-US" dirty="0">
+                <a:solidFill>
+                  <a:schemeClr val="bg1"/>
+                </a:solidFill>
+              </a:endParaRPr>
+            </a:p>
+          </p:txBody>
+        </p:sp>
+      </p:grpSp>
+      <p:grpSp>
+        <p:nvGrpSpPr>
+          <p:cNvPr id="6" name="Group 5">
+            <a:extLst>
+              <a:ext uri="{FF2B5EF4-FFF2-40B4-BE49-F238E27FC236}">
+                <a16:creationId xmlns:a16="http://schemas.microsoft.com/office/drawing/2014/main" id="{4E9CA44A-C3A1-4E34-8778-B9A03ADE6818}"/>
+              </a:ext>
+            </a:extLst>
+          </p:cNvPr>
+          <p:cNvGrpSpPr/>
+          <p:nvPr/>
+        </p:nvGrpSpPr>
+        <p:grpSpPr>
+          <a:xfrm>
+            <a:off x="3067812" y="1261782"/>
+            <a:ext cx="2743200" cy="2743200"/>
+            <a:chOff x="8789714" y="1261782"/>
+            <a:chExt cx="2743200" cy="2743200"/>
+          </a:xfrm>
+        </p:grpSpPr>
+        <p:pic>
+          <p:nvPicPr>
+            <p:cNvPr id="17" name="Picture 16">
+              <a:extLst>
+                <a:ext uri="{FF2B5EF4-FFF2-40B4-BE49-F238E27FC236}">
+                  <a16:creationId xmlns:a16="http://schemas.microsoft.com/office/drawing/2014/main" id="{BA9356E0-F476-4A3D-9D2F-DA0AC756C3CB}"/>
+                </a:ext>
+              </a:extLst>
+            </p:cNvPr>
+            <p:cNvPicPr>
+              <a:picLocks noChangeAspect="1"/>
+            </p:cNvPicPr>
+            <p:nvPr/>
+          </p:nvPicPr>
+          <p:blipFill>
+            <a:blip r:embed="rId5">
+              <a:extLst>
+                <a:ext uri="{28A0092B-C50C-407E-A947-70E740481C1C}">
+                  <a14:useLocalDpi xmlns:a14="http://schemas.microsoft.com/office/drawing/2010/main" val="0"/>
+                </a:ext>
+              </a:extLst>
+            </a:blip>
+            <a:srcRect/>
+            <a:stretch/>
+          </p:blipFill>
+          <p:spPr>
+            <a:xfrm>
+              <a:off x="8789714" y="1261782"/>
+              <a:ext cx="2743200" cy="2743200"/>
+            </a:xfrm>
+            <a:prstGeom prst="rect">
+              <a:avLst/>
+            </a:prstGeom>
+          </p:spPr>
+        </p:pic>
+        <p:sp>
+          <p:nvSpPr>
+            <p:cNvPr id="22" name="TextBox 21">
+              <a:extLst>
+                <a:ext uri="{FF2B5EF4-FFF2-40B4-BE49-F238E27FC236}">
+                  <a16:creationId xmlns:a16="http://schemas.microsoft.com/office/drawing/2014/main" id="{92822403-3D0B-4197-AE2F-04E2F4C882BF}"/>
+                </a:ext>
+              </a:extLst>
+            </p:cNvPr>
+            <p:cNvSpPr txBox="1"/>
+            <p:nvPr/>
+          </p:nvSpPr>
+          <p:spPr>
+            <a:xfrm>
+              <a:off x="9086691" y="2766198"/>
+              <a:ext cx="1101648" cy="369332"/>
+            </a:xfrm>
+            <a:prstGeom prst="rect">
+              <a:avLst/>
+            </a:prstGeom>
+            <a:noFill/>
+          </p:spPr>
+          <p:txBody>
+            <a:bodyPr wrap="none" rtlCol="0">
+              <a:spAutoFit/>
+            </a:bodyPr>
+            <a:lstStyle/>
+            <a:p>
+              <a:r>
+                <a:rPr lang="en-US" altLang="zh-CN" dirty="0">
+                  <a:solidFill>
+                    <a:schemeClr val="bg1"/>
+                  </a:solidFill>
+                </a:rPr>
+                <a:t>-2</a:t>
+              </a:r>
+              <a:r>
+                <a:rPr lang="en-US" altLang="zh-CN" baseline="30000" dirty="0">
+                  <a:solidFill>
+                    <a:schemeClr val="bg1"/>
+                  </a:solidFill>
+                </a:rPr>
+                <a:t>nd</a:t>
+              </a:r>
+              <a:r>
+                <a:rPr lang="en-US" altLang="zh-CN" dirty="0">
+                  <a:solidFill>
+                    <a:schemeClr val="bg1"/>
+                  </a:solidFill>
+                </a:rPr>
+                <a:t> order</a:t>
+              </a:r>
+              <a:endParaRPr lang="en-US" dirty="0">
+                <a:solidFill>
+                  <a:schemeClr val="bg1"/>
+                </a:solidFill>
+              </a:endParaRPr>
+            </a:p>
+          </p:txBody>
+        </p:sp>
+      </p:grpSp>
+      <p:pic>
+        <p:nvPicPr>
+          <p:cNvPr id="23" name="Picture 22">
+            <a:extLst>
+              <a:ext uri="{FF2B5EF4-FFF2-40B4-BE49-F238E27FC236}">
+                <a16:creationId xmlns:a16="http://schemas.microsoft.com/office/drawing/2014/main" id="{34AD19A7-C315-4934-B373-DAE581D3E758}"/>
+              </a:ext>
+            </a:extLst>
+          </p:cNvPr>
+          <p:cNvPicPr>
+            <a:picLocks noChangeAspect="1"/>
+          </p:cNvPicPr>
+          <p:nvPr/>
+        </p:nvPicPr>
+        <p:blipFill>
+          <a:blip r:embed="rId6">
+            <a:extLst>
+              <a:ext uri="{28A0092B-C50C-407E-A947-70E740481C1C}">
+                <a14:useLocalDpi xmlns:a14="http://schemas.microsoft.com/office/drawing/2010/main" val="0"/>
+              </a:ext>
+            </a:extLst>
+          </a:blip>
+          <a:srcRect/>
+          <a:stretch/>
+        </p:blipFill>
+        <p:spPr>
+          <a:xfrm>
+            <a:off x="5862201" y="3899826"/>
+            <a:ext cx="2743200" cy="2743200"/>
+          </a:xfrm>
+          <a:prstGeom prst="rect">
+            <a:avLst/>
+          </a:prstGeom>
+        </p:spPr>
+      </p:pic>
+      <p:grpSp>
+        <p:nvGrpSpPr>
+          <p:cNvPr id="24" name="Group 23">
+            <a:extLst>
+              <a:ext uri="{FF2B5EF4-FFF2-40B4-BE49-F238E27FC236}">
+                <a16:creationId xmlns:a16="http://schemas.microsoft.com/office/drawing/2014/main" id="{11FC50B8-3126-40F3-9C0F-70F4CE42E513}"/>
+              </a:ext>
+            </a:extLst>
+          </p:cNvPr>
+          <p:cNvGrpSpPr/>
+          <p:nvPr/>
+        </p:nvGrpSpPr>
+        <p:grpSpPr>
+          <a:xfrm>
+            <a:off x="5940285" y="1261782"/>
+            <a:ext cx="2743200" cy="2743200"/>
+            <a:chOff x="8789714" y="1261782"/>
+            <a:chExt cx="2743200" cy="2743200"/>
+          </a:xfrm>
+        </p:grpSpPr>
+        <p:pic>
+          <p:nvPicPr>
+            <p:cNvPr id="25" name="Picture 24">
+              <a:extLst>
+                <a:ext uri="{FF2B5EF4-FFF2-40B4-BE49-F238E27FC236}">
+                  <a16:creationId xmlns:a16="http://schemas.microsoft.com/office/drawing/2014/main" id="{CEE31813-A585-41C0-94C0-84C4F5DB294D}"/>
+                </a:ext>
+              </a:extLst>
+            </p:cNvPr>
+            <p:cNvPicPr>
+              <a:picLocks noChangeAspect="1"/>
+            </p:cNvPicPr>
+            <p:nvPr/>
+          </p:nvPicPr>
+          <p:blipFill>
+            <a:blip r:embed="rId7">
+              <a:extLst>
+                <a:ext uri="{28A0092B-C50C-407E-A947-70E740481C1C}">
+                  <a14:useLocalDpi xmlns:a14="http://schemas.microsoft.com/office/drawing/2010/main" val="0"/>
+                </a:ext>
+              </a:extLst>
+            </a:blip>
+            <a:srcRect/>
+            <a:stretch/>
+          </p:blipFill>
+          <p:spPr>
+            <a:xfrm>
+              <a:off x="8789714" y="1261782"/>
+              <a:ext cx="2743200" cy="2743200"/>
+            </a:xfrm>
+            <a:prstGeom prst="rect">
+              <a:avLst/>
+            </a:prstGeom>
+          </p:spPr>
+        </p:pic>
+        <p:sp>
+          <p:nvSpPr>
+            <p:cNvPr id="26" name="TextBox 25">
+              <a:extLst>
+                <a:ext uri="{FF2B5EF4-FFF2-40B4-BE49-F238E27FC236}">
+                  <a16:creationId xmlns:a16="http://schemas.microsoft.com/office/drawing/2014/main" id="{19479F55-04BB-452D-A27D-4A6F222385CD}"/>
+                </a:ext>
+              </a:extLst>
+            </p:cNvPr>
+            <p:cNvSpPr txBox="1"/>
+            <p:nvPr/>
+          </p:nvSpPr>
+          <p:spPr>
+            <a:xfrm>
+              <a:off x="9086691" y="2766198"/>
+              <a:ext cx="1101648" cy="369332"/>
+            </a:xfrm>
+            <a:prstGeom prst="rect">
+              <a:avLst/>
+            </a:prstGeom>
+            <a:noFill/>
+          </p:spPr>
+          <p:txBody>
+            <a:bodyPr wrap="none" rtlCol="0">
+              <a:spAutoFit/>
+            </a:bodyPr>
+            <a:lstStyle/>
+            <a:p>
+              <a:r>
+                <a:rPr lang="en-US" altLang="zh-CN" dirty="0">
+                  <a:solidFill>
+                    <a:schemeClr val="bg1"/>
+                  </a:solidFill>
+                </a:rPr>
+                <a:t>-2</a:t>
+              </a:r>
+              <a:r>
+                <a:rPr lang="en-US" altLang="zh-CN" baseline="30000" dirty="0">
+                  <a:solidFill>
+                    <a:schemeClr val="bg1"/>
+                  </a:solidFill>
+                </a:rPr>
+                <a:t>nd</a:t>
+              </a:r>
+              <a:r>
+                <a:rPr lang="en-US" altLang="zh-CN" dirty="0">
+                  <a:solidFill>
+                    <a:schemeClr val="bg1"/>
+                  </a:solidFill>
+                </a:rPr>
+                <a:t> order</a:t>
+              </a:r>
+              <a:endParaRPr lang="en-US" dirty="0">
+                <a:solidFill>
+                  <a:schemeClr val="bg1"/>
+                </a:solidFill>
+              </a:endParaRPr>
+            </a:p>
+          </p:txBody>
+        </p:sp>
+      </p:grpSp>
     </p:spTree>
     <p:extLst>
       <p:ext uri="{BB962C8B-B14F-4D97-AF65-F5344CB8AC3E}">
-        <p14:creationId xmlns:p14="http://schemas.microsoft.com/office/powerpoint/2010/main" val="515611632"/>
+        <p14:creationId xmlns:p14="http://schemas.microsoft.com/office/powerpoint/2010/main" val="1675068092"/>
       </p:ext>
     </p:extLst>
   </p:cSld>

</xml_diff>